<commit_message>
Mise à jour du diaporama
</commit_message>
<xml_diff>
--- a/Rouviere/PresentationCPGE_Terminale_2014.pptx
+++ b/Rouviere/PresentationCPGE_Terminale_2014.pptx
@@ -5,7 +5,7 @@
     <p:sldMasterId id="2147483948" r:id="rId1"/>
   </p:sldMasterIdLst>
   <p:notesMasterIdLst>
-    <p:notesMasterId r:id="rId17"/>
+    <p:notesMasterId r:id="rId18"/>
   </p:notesMasterIdLst>
   <p:sldIdLst>
     <p:sldId id="256" r:id="rId2"/>
@@ -23,6 +23,7 @@
     <p:sldId id="274" r:id="rId14"/>
     <p:sldId id="285" r:id="rId15"/>
     <p:sldId id="262" r:id="rId16"/>
+    <p:sldId id="288" r:id="rId17"/>
   </p:sldIdLst>
   <p:sldSz cx="9144000" cy="6858000" type="screen4x3"/>
   <p:notesSz cx="6858000" cy="9144000"/>
@@ -123,7 +124,7 @@
   </p:defaultTextStyle>
   <p:extLst>
     <p:ext uri="{EFAFB233-063F-42B5-8137-9DF3F51BA10A}">
-      <p15:sldGuideLst xmlns:p15="http://schemas.microsoft.com/office/powerpoint/2012/main" xmlns="">
+      <p15:sldGuideLst xmlns="" xmlns:p15="http://schemas.microsoft.com/office/powerpoint/2012/main">
         <p15:guide id="1" orient="horz" pos="2160">
           <p15:clr>
             <a:srgbClr val="A4A3A4"/>
@@ -137,7 +138,7 @@
       </p15:sldGuideLst>
     </p:ext>
     <p:ext uri="{2D200454-40CA-4A62-9FC3-DE9A4176ACB9}">
-      <p15:notesGuideLst xmlns:p15="http://schemas.microsoft.com/office/powerpoint/2012/main" xmlns="">
+      <p15:notesGuideLst xmlns="" xmlns:p15="http://schemas.microsoft.com/office/powerpoint/2012/main">
         <p15:guide id="1" orient="horz" pos="2880">
           <p15:clr>
             <a:srgbClr val="A4A3A4"/>
@@ -237,7 +238,7 @@
             <a:fld id="{D27F0A6E-5B86-4EF6-83C5-0BD3A3DA83B6}" type="datetimeFigureOut">
               <a:rPr lang="fr-FR" smtClean="0"/>
               <a:pPr/>
-              <a:t>16/12/2014</a:t>
+              <a:t>18/12/2014</a:t>
             </a:fld>
             <a:endParaRPr lang="fr-FR"/>
           </a:p>
@@ -735,7 +736,7 @@
             <a:fld id="{80E03CF1-1404-4F96-BE00-E12027A9533E}" type="datetime1">
               <a:rPr lang="fr-FR" smtClean="0"/>
               <a:pPr/>
-              <a:t>16/12/2014</a:t>
+              <a:t>18/12/2014</a:t>
             </a:fld>
             <a:endParaRPr lang="fr-FR"/>
           </a:p>
@@ -1111,7 +1112,7 @@
             <a:fld id="{323B191B-AB47-426E-987B-E782239FA91B}" type="datetime1">
               <a:rPr lang="fr-FR" smtClean="0"/>
               <a:pPr/>
-              <a:t>16/12/2014</a:t>
+              <a:t>18/12/2014</a:t>
             </a:fld>
             <a:endParaRPr lang="fr-FR"/>
           </a:p>
@@ -1292,7 +1293,7 @@
             <a:fld id="{2E24AE71-937F-4660-B9E2-F4542EB1EFF8}" type="datetime1">
               <a:rPr lang="fr-FR" smtClean="0"/>
               <a:pPr/>
-              <a:t>16/12/2014</a:t>
+              <a:t>18/12/2014</a:t>
             </a:fld>
             <a:endParaRPr lang="fr-FR"/>
           </a:p>
@@ -1533,7 +1534,7 @@
             <a:fld id="{A73A6D3F-1386-42A6-B79C-6D98CF025A8B}" type="datetime1">
               <a:rPr lang="fr-FR" smtClean="0"/>
               <a:pPr/>
-              <a:t>16/12/2014</a:t>
+              <a:t>18/12/2014</a:t>
             </a:fld>
             <a:endParaRPr lang="fr-FR"/>
           </a:p>
@@ -1824,7 +1825,7 @@
             <a:fld id="{288C7ECB-308C-419E-8581-EEC8E4D8967A}" type="datetime1">
               <a:rPr lang="fr-FR" smtClean="0"/>
               <a:pPr/>
-              <a:t>16/12/2014</a:t>
+              <a:t>18/12/2014</a:t>
             </a:fld>
             <a:endParaRPr lang="fr-FR"/>
           </a:p>
@@ -2061,7 +2062,7 @@
             <a:fld id="{B6B6314F-365B-4C6F-8D82-6E5EB6286A9B}" type="datetime1">
               <a:rPr lang="fr-FR" smtClean="0"/>
               <a:pPr/>
-              <a:t>16/12/2014</a:t>
+              <a:t>18/12/2014</a:t>
             </a:fld>
             <a:endParaRPr lang="fr-FR"/>
           </a:p>
@@ -2419,7 +2420,7 @@
             <a:fld id="{1E8843A6-341C-476E-A93B-81A14334ACEE}" type="datetime1">
               <a:rPr lang="fr-FR" smtClean="0"/>
               <a:pPr/>
-              <a:t>16/12/2014</a:t>
+              <a:t>18/12/2014</a:t>
             </a:fld>
             <a:endParaRPr lang="fr-FR"/>
           </a:p>
@@ -2657,7 +2658,7 @@
             <a:fld id="{5768B1D7-73E1-4220-81C1-FAF0BD4D5D13}" type="datetime1">
               <a:rPr lang="fr-FR" smtClean="0"/>
               <a:pPr/>
-              <a:t>16/12/2014</a:t>
+              <a:t>18/12/2014</a:t>
             </a:fld>
             <a:endParaRPr lang="fr-FR"/>
           </a:p>
@@ -2803,7 +2804,7 @@
             <a:fld id="{1B827170-7CAC-49A9-856E-4244E0368B3A}" type="datetime1">
               <a:rPr lang="fr-FR" smtClean="0"/>
               <a:pPr/>
-              <a:t>16/12/2014</a:t>
+              <a:t>18/12/2014</a:t>
             </a:fld>
             <a:endParaRPr lang="fr-FR"/>
           </a:p>
@@ -3086,7 +3087,7 @@
             <a:fld id="{5455D6C3-CBA9-4018-A399-639C4047CA06}" type="datetime1">
               <a:rPr lang="fr-FR" smtClean="0"/>
               <a:pPr/>
-              <a:t>16/12/2014</a:t>
+              <a:t>18/12/2014</a:t>
             </a:fld>
             <a:endParaRPr lang="fr-FR"/>
           </a:p>
@@ -3499,7 +3500,7 @@
             <a:fld id="{E6D8053A-ED5F-4450-88CD-62059A238D42}" type="datetime1">
               <a:rPr lang="fr-FR" smtClean="0"/>
               <a:pPr/>
-              <a:t>16/12/2014</a:t>
+              <a:t>18/12/2014</a:t>
             </a:fld>
             <a:endParaRPr lang="fr-FR"/>
           </a:p>
@@ -3843,7 +3844,7 @@
             <a:fld id="{D2A41902-4600-44E3-86DD-AB29023CD1D1}" type="datetime1">
               <a:rPr lang="fr-FR" smtClean="0"/>
               <a:pPr/>
-              <a:t>16/12/2014</a:t>
+              <a:t>18/12/2014</a:t>
             </a:fld>
             <a:endParaRPr lang="fr-FR"/>
           </a:p>
@@ -4613,966 +4614,1073 @@
           </a:p>
         </p:txBody>
       </p:sp>
-      <p:sp>
-        <p:nvSpPr>
-          <p:cNvPr id="10" name="Rectangle 9"/>
-          <p:cNvSpPr/>
+      <p:grpSp>
+        <p:nvGrpSpPr>
+          <p:cNvPr id="5" name="Groupe 4"/>
+          <p:cNvGrpSpPr/>
           <p:nvPr/>
-        </p:nvSpPr>
-        <p:spPr>
+        </p:nvGrpSpPr>
+        <p:grpSpPr>
           <a:xfrm>
-            <a:off x="701520" y="1493760"/>
-            <a:ext cx="3053232" cy="450000"/>
+            <a:off x="251520" y="1493760"/>
+            <a:ext cx="3503232" cy="1800000"/>
+            <a:chOff x="251520" y="1493760"/>
+            <a:chExt cx="3503232" cy="1800000"/>
           </a:xfrm>
-          <a:prstGeom prst="rect">
-            <a:avLst/>
-          </a:prstGeom>
-          <a:solidFill>
-            <a:srgbClr val="FF0000"/>
-          </a:solidFill>
-        </p:spPr>
-        <p:style>
-          <a:lnRef idx="2">
-            <a:schemeClr val="accent1">
-              <a:shade val="50000"/>
-            </a:schemeClr>
-          </a:lnRef>
-          <a:fillRef idx="1">
-            <a:schemeClr val="accent1"/>
-          </a:fillRef>
-          <a:effectRef idx="0">
-            <a:schemeClr val="accent1"/>
-          </a:effectRef>
-          <a:fontRef idx="minor">
-            <a:schemeClr val="lt1"/>
-          </a:fontRef>
-        </p:style>
-        <p:txBody>
-          <a:bodyPr rtlCol="0" anchor="ctr"/>
-          <a:lstStyle/>
-          <a:p>
-            <a:pPr algn="ctr"/>
-            <a:r>
-              <a:rPr lang="fr-FR" sz="1600" dirty="0" smtClean="0"/>
-              <a:t>Mathématiques </a:t>
-            </a:r>
-            <a:endParaRPr lang="fr-FR" sz="1600" dirty="0"/>
-          </a:p>
-        </p:txBody>
-      </p:sp>
-      <p:sp>
-        <p:nvSpPr>
-          <p:cNvPr id="11" name="Rectangle 10"/>
-          <p:cNvSpPr/>
-          <p:nvPr/>
-        </p:nvSpPr>
-        <p:spPr>
-          <a:xfrm>
-            <a:off x="701520" y="1943760"/>
-            <a:ext cx="2571143" cy="450000"/>
-          </a:xfrm>
-          <a:prstGeom prst="rect">
-            <a:avLst/>
-          </a:prstGeom>
-          <a:solidFill>
-            <a:srgbClr val="00B050"/>
-          </a:solidFill>
-        </p:spPr>
-        <p:style>
-          <a:lnRef idx="2">
-            <a:schemeClr val="accent1">
-              <a:shade val="50000"/>
-            </a:schemeClr>
-          </a:lnRef>
-          <a:fillRef idx="1">
-            <a:schemeClr val="accent1"/>
-          </a:fillRef>
-          <a:effectRef idx="0">
-            <a:schemeClr val="accent1"/>
-          </a:effectRef>
-          <a:fontRef idx="minor">
-            <a:schemeClr val="lt1"/>
-          </a:fontRef>
-        </p:style>
-        <p:txBody>
-          <a:bodyPr rtlCol="0" anchor="ctr"/>
-          <a:lstStyle/>
-          <a:p>
-            <a:pPr algn="ctr"/>
-            <a:r>
-              <a:rPr lang="fr-FR" sz="1600" dirty="0" smtClean="0"/>
-              <a:t>Physique-Chimie</a:t>
-            </a:r>
-            <a:endParaRPr lang="fr-FR" sz="1600" dirty="0"/>
-          </a:p>
-        </p:txBody>
-      </p:sp>
-      <p:sp>
-        <p:nvSpPr>
-          <p:cNvPr id="12" name="Rectangle 11"/>
-          <p:cNvSpPr/>
-          <p:nvPr/>
-        </p:nvSpPr>
-        <p:spPr>
-          <a:xfrm>
-            <a:off x="701520" y="2393760"/>
-            <a:ext cx="2731839" cy="450000"/>
-          </a:xfrm>
-          <a:prstGeom prst="rect">
-            <a:avLst/>
-          </a:prstGeom>
-          <a:solidFill>
-            <a:srgbClr val="00B0F0"/>
-          </a:solidFill>
-        </p:spPr>
-        <p:style>
-          <a:lnRef idx="2">
-            <a:schemeClr val="accent1">
-              <a:shade val="50000"/>
-            </a:schemeClr>
-          </a:lnRef>
-          <a:fillRef idx="1">
-            <a:schemeClr val="accent1"/>
-          </a:fillRef>
-          <a:effectRef idx="0">
-            <a:schemeClr val="accent1"/>
-          </a:effectRef>
-          <a:fontRef idx="minor">
-            <a:schemeClr val="lt1"/>
-          </a:fontRef>
-        </p:style>
-        <p:txBody>
-          <a:bodyPr rtlCol="0" anchor="ctr"/>
-          <a:lstStyle/>
-          <a:p>
-            <a:pPr algn="ctr"/>
-            <a:r>
-              <a:rPr lang="fr-FR" sz="1600" dirty="0" smtClean="0"/>
-              <a:t>SII</a:t>
-            </a:r>
-            <a:endParaRPr lang="fr-FR" sz="1600" dirty="0"/>
-          </a:p>
-        </p:txBody>
-      </p:sp>
-      <p:sp>
-        <p:nvSpPr>
-          <p:cNvPr id="13" name="Rectangle 12"/>
-          <p:cNvSpPr/>
-          <p:nvPr/>
-        </p:nvSpPr>
-        <p:spPr>
-          <a:xfrm>
-            <a:off x="701520" y="2843760"/>
-            <a:ext cx="1285571" cy="450000"/>
-          </a:xfrm>
-          <a:prstGeom prst="rect">
-            <a:avLst/>
-          </a:prstGeom>
-          <a:solidFill>
-            <a:srgbClr val="FFC000"/>
-          </a:solidFill>
-        </p:spPr>
-        <p:style>
-          <a:lnRef idx="2">
-            <a:schemeClr val="accent1">
-              <a:shade val="50000"/>
-            </a:schemeClr>
-          </a:lnRef>
-          <a:fillRef idx="1">
-            <a:schemeClr val="accent1"/>
-          </a:fillRef>
-          <a:effectRef idx="0">
-            <a:schemeClr val="accent1"/>
-          </a:effectRef>
-          <a:fontRef idx="minor">
-            <a:schemeClr val="lt1"/>
-          </a:fontRef>
-        </p:style>
-        <p:txBody>
-          <a:bodyPr rtlCol="0" anchor="ctr"/>
-          <a:lstStyle/>
-          <a:p>
-            <a:pPr algn="ctr"/>
-            <a:r>
-              <a:rPr lang="fr-FR" sz="1600" dirty="0" smtClean="0">
+        </p:grpSpPr>
+        <p:sp>
+          <p:nvSpPr>
+            <p:cNvPr id="10" name="Rectangle 9"/>
+            <p:cNvSpPr/>
+            <p:nvPr/>
+          </p:nvSpPr>
+          <p:spPr>
+            <a:xfrm>
+              <a:off x="701520" y="1493760"/>
+              <a:ext cx="3053232" cy="450000"/>
+            </a:xfrm>
+            <a:prstGeom prst="rect">
+              <a:avLst/>
+            </a:prstGeom>
+            <a:solidFill>
+              <a:srgbClr val="FF0000"/>
+            </a:solidFill>
+          </p:spPr>
+          <p:style>
+            <a:lnRef idx="2">
+              <a:schemeClr val="accent1">
+                <a:shade val="50000"/>
+              </a:schemeClr>
+            </a:lnRef>
+            <a:fillRef idx="1">
+              <a:schemeClr val="accent1"/>
+            </a:fillRef>
+            <a:effectRef idx="0">
+              <a:schemeClr val="accent1"/>
+            </a:effectRef>
+            <a:fontRef idx="minor">
+              <a:schemeClr val="lt1"/>
+            </a:fontRef>
+          </p:style>
+          <p:txBody>
+            <a:bodyPr rtlCol="0" anchor="ctr"/>
+            <a:lstStyle/>
+            <a:p>
+              <a:pPr algn="ctr"/>
+              <a:r>
+                <a:rPr lang="fr-FR" sz="1600" dirty="0" smtClean="0"/>
+                <a:t>Mathématiques </a:t>
+              </a:r>
+              <a:endParaRPr lang="fr-FR" sz="1600" dirty="0"/>
+            </a:p>
+          </p:txBody>
+        </p:sp>
+        <p:sp>
+          <p:nvSpPr>
+            <p:cNvPr id="11" name="Rectangle 10"/>
+            <p:cNvSpPr/>
+            <p:nvPr/>
+          </p:nvSpPr>
+          <p:spPr>
+            <a:xfrm>
+              <a:off x="701520" y="1943760"/>
+              <a:ext cx="2571143" cy="450000"/>
+            </a:xfrm>
+            <a:prstGeom prst="rect">
+              <a:avLst/>
+            </a:prstGeom>
+            <a:solidFill>
+              <a:srgbClr val="00B050"/>
+            </a:solidFill>
+          </p:spPr>
+          <p:style>
+            <a:lnRef idx="2">
+              <a:schemeClr val="accent1">
+                <a:shade val="50000"/>
+              </a:schemeClr>
+            </a:lnRef>
+            <a:fillRef idx="1">
+              <a:schemeClr val="accent1"/>
+            </a:fillRef>
+            <a:effectRef idx="0">
+              <a:schemeClr val="accent1"/>
+            </a:effectRef>
+            <a:fontRef idx="minor">
+              <a:schemeClr val="lt1"/>
+            </a:fontRef>
+          </p:style>
+          <p:txBody>
+            <a:bodyPr rtlCol="0" anchor="ctr"/>
+            <a:lstStyle/>
+            <a:p>
+              <a:pPr algn="ctr"/>
+              <a:r>
+                <a:rPr lang="fr-FR" sz="1600" dirty="0" smtClean="0"/>
+                <a:t>Physique-Chimie</a:t>
+              </a:r>
+              <a:endParaRPr lang="fr-FR" sz="1600" dirty="0"/>
+            </a:p>
+          </p:txBody>
+        </p:sp>
+        <p:sp>
+          <p:nvSpPr>
+            <p:cNvPr id="12" name="Rectangle 11"/>
+            <p:cNvSpPr/>
+            <p:nvPr/>
+          </p:nvSpPr>
+          <p:spPr>
+            <a:xfrm>
+              <a:off x="701520" y="2393760"/>
+              <a:ext cx="2731839" cy="450000"/>
+            </a:xfrm>
+            <a:prstGeom prst="rect">
+              <a:avLst/>
+            </a:prstGeom>
+            <a:solidFill>
+              <a:srgbClr val="00B0F0"/>
+            </a:solidFill>
+          </p:spPr>
+          <p:style>
+            <a:lnRef idx="2">
+              <a:schemeClr val="accent1">
+                <a:shade val="50000"/>
+              </a:schemeClr>
+            </a:lnRef>
+            <a:fillRef idx="1">
+              <a:schemeClr val="accent1"/>
+            </a:fillRef>
+            <a:effectRef idx="0">
+              <a:schemeClr val="accent1"/>
+            </a:effectRef>
+            <a:fontRef idx="minor">
+              <a:schemeClr val="lt1"/>
+            </a:fontRef>
+          </p:style>
+          <p:txBody>
+            <a:bodyPr rtlCol="0" anchor="ctr"/>
+            <a:lstStyle/>
+            <a:p>
+              <a:pPr algn="ctr"/>
+              <a:r>
+                <a:rPr lang="fr-FR" sz="1600" dirty="0" smtClean="0"/>
+                <a:t>SII</a:t>
+              </a:r>
+              <a:endParaRPr lang="fr-FR" sz="1600" dirty="0"/>
+            </a:p>
+          </p:txBody>
+        </p:sp>
+        <p:sp>
+          <p:nvSpPr>
+            <p:cNvPr id="13" name="Rectangle 12"/>
+            <p:cNvSpPr/>
+            <p:nvPr/>
+          </p:nvSpPr>
+          <p:spPr>
+            <a:xfrm>
+              <a:off x="701520" y="2843760"/>
+              <a:ext cx="1285571" cy="450000"/>
+            </a:xfrm>
+            <a:prstGeom prst="rect">
+              <a:avLst/>
+            </a:prstGeom>
+            <a:solidFill>
+              <a:srgbClr val="FFC000"/>
+            </a:solidFill>
+          </p:spPr>
+          <p:style>
+            <a:lnRef idx="2">
+              <a:schemeClr val="accent1">
+                <a:shade val="50000"/>
+              </a:schemeClr>
+            </a:lnRef>
+            <a:fillRef idx="1">
+              <a:schemeClr val="accent1"/>
+            </a:fillRef>
+            <a:effectRef idx="0">
+              <a:schemeClr val="accent1"/>
+            </a:effectRef>
+            <a:fontRef idx="minor">
+              <a:schemeClr val="lt1"/>
+            </a:fontRef>
+          </p:style>
+          <p:txBody>
+            <a:bodyPr rtlCol="0" anchor="ctr"/>
+            <a:lstStyle/>
+            <a:p>
+              <a:pPr algn="ctr"/>
+              <a:r>
+                <a:rPr lang="fr-FR" sz="1600" dirty="0" smtClean="0">
+                  <a:solidFill>
+                    <a:schemeClr val="tx1"/>
+                  </a:solidFill>
+                </a:rPr>
+                <a:t>Lettres + LV</a:t>
+              </a:r>
+              <a:endParaRPr lang="fr-FR" sz="1600" dirty="0">
                 <a:solidFill>
                   <a:schemeClr val="tx1"/>
                 </a:solidFill>
-              </a:rPr>
-              <a:t>Lettres + LV</a:t>
-            </a:r>
-            <a:endParaRPr lang="fr-FR" sz="1600" dirty="0">
-              <a:solidFill>
-                <a:schemeClr val="tx1"/>
-              </a:solidFill>
-            </a:endParaRPr>
-          </a:p>
-        </p:txBody>
-      </p:sp>
-      <p:sp>
-        <p:nvSpPr>
-          <p:cNvPr id="14" name="Rectangle 13"/>
-          <p:cNvSpPr/>
+              </a:endParaRPr>
+            </a:p>
+          </p:txBody>
+        </p:sp>
+        <p:sp>
+          <p:nvSpPr>
+            <p:cNvPr id="14" name="Rectangle 13"/>
+            <p:cNvSpPr/>
+            <p:nvPr/>
+          </p:nvSpPr>
+          <p:spPr>
+            <a:xfrm rot="16200000">
+              <a:off x="-423480" y="2168760"/>
+              <a:ext cx="1800000" cy="450000"/>
+            </a:xfrm>
+            <a:prstGeom prst="rect">
+              <a:avLst/>
+            </a:prstGeom>
+          </p:spPr>
+          <p:style>
+            <a:lnRef idx="2">
+              <a:schemeClr val="accent1">
+                <a:shade val="50000"/>
+              </a:schemeClr>
+            </a:lnRef>
+            <a:fillRef idx="1">
+              <a:schemeClr val="accent1"/>
+            </a:fillRef>
+            <a:effectRef idx="0">
+              <a:schemeClr val="accent1"/>
+            </a:effectRef>
+            <a:fontRef idx="minor">
+              <a:schemeClr val="lt1"/>
+            </a:fontRef>
+          </p:style>
+          <p:txBody>
+            <a:bodyPr rtlCol="0" anchor="ctr"/>
+            <a:lstStyle/>
+            <a:p>
+              <a:pPr algn="ctr"/>
+              <a:r>
+                <a:rPr lang="fr-FR" sz="2400" b="1" dirty="0" smtClean="0"/>
+                <a:t>PTSI</a:t>
+              </a:r>
+              <a:endParaRPr lang="fr-FR" sz="2400" b="1" dirty="0"/>
+            </a:p>
+          </p:txBody>
+        </p:sp>
+      </p:grpSp>
+      <p:grpSp>
+        <p:nvGrpSpPr>
+          <p:cNvPr id="7" name="Groupe 6"/>
+          <p:cNvGrpSpPr/>
           <p:nvPr/>
-        </p:nvSpPr>
-        <p:spPr>
-          <a:xfrm rot="16200000">
-            <a:off x="-423480" y="2168760"/>
-            <a:ext cx="1800000" cy="450000"/>
+        </p:nvGrpSpPr>
+        <p:grpSpPr>
+          <a:xfrm>
+            <a:off x="251519" y="4124610"/>
+            <a:ext cx="4306714" cy="1800000"/>
+            <a:chOff x="251519" y="4124610"/>
+            <a:chExt cx="4306714" cy="1800000"/>
           </a:xfrm>
-          <a:prstGeom prst="rect">
-            <a:avLst/>
-          </a:prstGeom>
-        </p:spPr>
-        <p:style>
-          <a:lnRef idx="2">
-            <a:schemeClr val="accent1">
-              <a:shade val="50000"/>
-            </a:schemeClr>
-          </a:lnRef>
-          <a:fillRef idx="1">
-            <a:schemeClr val="accent1"/>
-          </a:fillRef>
-          <a:effectRef idx="0">
-            <a:schemeClr val="accent1"/>
-          </a:effectRef>
-          <a:fontRef idx="minor">
-            <a:schemeClr val="lt1"/>
-          </a:fontRef>
-        </p:style>
-        <p:txBody>
-          <a:bodyPr rtlCol="0" anchor="ctr"/>
-          <a:lstStyle/>
-          <a:p>
-            <a:pPr algn="ctr"/>
-            <a:r>
-              <a:rPr lang="fr-FR" sz="2400" b="1" dirty="0" smtClean="0"/>
-              <a:t>PTSI</a:t>
-            </a:r>
-            <a:endParaRPr lang="fr-FR" sz="2400" b="1" dirty="0"/>
-          </a:p>
-        </p:txBody>
-      </p:sp>
-      <p:sp>
-        <p:nvSpPr>
-          <p:cNvPr id="17" name="Rectangle 16"/>
-          <p:cNvSpPr/>
-          <p:nvPr/>
-        </p:nvSpPr>
-        <p:spPr>
-          <a:xfrm>
-            <a:off x="701519" y="4124610"/>
-            <a:ext cx="3856714" cy="450000"/>
-          </a:xfrm>
-          <a:prstGeom prst="rect">
-            <a:avLst/>
-          </a:prstGeom>
-          <a:solidFill>
-            <a:srgbClr val="FF0000"/>
-          </a:solidFill>
-        </p:spPr>
-        <p:style>
-          <a:lnRef idx="2">
-            <a:schemeClr val="accent1">
-              <a:shade val="50000"/>
-            </a:schemeClr>
-          </a:lnRef>
-          <a:fillRef idx="1">
-            <a:schemeClr val="accent1"/>
-          </a:fillRef>
-          <a:effectRef idx="0">
-            <a:schemeClr val="accent1"/>
-          </a:effectRef>
-          <a:fontRef idx="minor">
-            <a:schemeClr val="lt1"/>
-          </a:fontRef>
-        </p:style>
-        <p:txBody>
-          <a:bodyPr rtlCol="0" anchor="ctr"/>
-          <a:lstStyle/>
-          <a:p>
-            <a:pPr algn="ctr"/>
-            <a:r>
-              <a:rPr lang="fr-FR" dirty="0" smtClean="0"/>
-              <a:t>Mathématiques </a:t>
-            </a:r>
-            <a:endParaRPr lang="fr-FR" dirty="0"/>
-          </a:p>
-        </p:txBody>
-      </p:sp>
-      <p:sp>
-        <p:nvSpPr>
-          <p:cNvPr id="18" name="Rectangle 17"/>
-          <p:cNvSpPr/>
-          <p:nvPr/>
-        </p:nvSpPr>
-        <p:spPr>
-          <a:xfrm>
-            <a:off x="701519" y="4574610"/>
-            <a:ext cx="2571143" cy="450000"/>
-          </a:xfrm>
-          <a:prstGeom prst="rect">
-            <a:avLst/>
-          </a:prstGeom>
-          <a:solidFill>
-            <a:srgbClr val="00B050"/>
-          </a:solidFill>
-        </p:spPr>
-        <p:style>
-          <a:lnRef idx="2">
-            <a:schemeClr val="accent1">
-              <a:shade val="50000"/>
-            </a:schemeClr>
-          </a:lnRef>
-          <a:fillRef idx="1">
-            <a:schemeClr val="accent1"/>
-          </a:fillRef>
-          <a:effectRef idx="0">
-            <a:schemeClr val="accent1"/>
-          </a:effectRef>
-          <a:fontRef idx="minor">
-            <a:schemeClr val="lt1"/>
-          </a:fontRef>
-        </p:style>
-        <p:txBody>
-          <a:bodyPr rtlCol="0" anchor="ctr"/>
-          <a:lstStyle/>
-          <a:p>
-            <a:pPr algn="ctr"/>
-            <a:r>
-              <a:rPr lang="fr-FR" dirty="0" smtClean="0"/>
-              <a:t>Physique-Chimie</a:t>
-            </a:r>
-            <a:endParaRPr lang="fr-FR" dirty="0"/>
-          </a:p>
-        </p:txBody>
-      </p:sp>
-      <p:sp>
-        <p:nvSpPr>
-          <p:cNvPr id="19" name="Rectangle 18"/>
-          <p:cNvSpPr/>
-          <p:nvPr/>
-        </p:nvSpPr>
-        <p:spPr>
-          <a:xfrm>
-            <a:off x="701519" y="5024610"/>
-            <a:ext cx="642786" cy="450000"/>
-          </a:xfrm>
-          <a:prstGeom prst="rect">
-            <a:avLst/>
-          </a:prstGeom>
-          <a:solidFill>
-            <a:srgbClr val="00B0F0"/>
-          </a:solidFill>
-        </p:spPr>
-        <p:style>
-          <a:lnRef idx="2">
-            <a:schemeClr val="accent1">
-              <a:shade val="50000"/>
-            </a:schemeClr>
-          </a:lnRef>
-          <a:fillRef idx="1">
-            <a:schemeClr val="accent1"/>
-          </a:fillRef>
-          <a:effectRef idx="0">
-            <a:schemeClr val="accent1"/>
-          </a:effectRef>
-          <a:fontRef idx="minor">
-            <a:schemeClr val="lt1"/>
-          </a:fontRef>
-        </p:style>
-        <p:txBody>
-          <a:bodyPr rtlCol="0" anchor="ctr"/>
-          <a:lstStyle/>
-          <a:p>
-            <a:pPr algn="ctr"/>
-            <a:r>
-              <a:rPr lang="fr-FR" dirty="0" smtClean="0"/>
-              <a:t>SII</a:t>
-            </a:r>
-            <a:endParaRPr lang="fr-FR" dirty="0"/>
-          </a:p>
-        </p:txBody>
-      </p:sp>
-      <p:sp>
-        <p:nvSpPr>
-          <p:cNvPr id="20" name="Rectangle 19"/>
-          <p:cNvSpPr/>
-          <p:nvPr/>
-        </p:nvSpPr>
-        <p:spPr>
-          <a:xfrm>
-            <a:off x="701519" y="5474610"/>
-            <a:ext cx="1285571" cy="450000"/>
-          </a:xfrm>
-          <a:prstGeom prst="rect">
-            <a:avLst/>
-          </a:prstGeom>
-          <a:solidFill>
-            <a:srgbClr val="FFC000"/>
-          </a:solidFill>
-        </p:spPr>
-        <p:style>
-          <a:lnRef idx="2">
-            <a:schemeClr val="accent1">
-              <a:shade val="50000"/>
-            </a:schemeClr>
-          </a:lnRef>
-          <a:fillRef idx="1">
-            <a:schemeClr val="accent1"/>
-          </a:fillRef>
-          <a:effectRef idx="0">
-            <a:schemeClr val="accent1"/>
-          </a:effectRef>
-          <a:fontRef idx="minor">
-            <a:schemeClr val="lt1"/>
-          </a:fontRef>
-        </p:style>
-        <p:txBody>
-          <a:bodyPr rtlCol="0" anchor="ctr"/>
-          <a:lstStyle/>
-          <a:p>
-            <a:pPr algn="ctr"/>
-            <a:r>
-              <a:rPr lang="fr-FR" sz="1600" dirty="0" smtClean="0">
+        </p:grpSpPr>
+        <p:sp>
+          <p:nvSpPr>
+            <p:cNvPr id="17" name="Rectangle 16"/>
+            <p:cNvSpPr/>
+            <p:nvPr/>
+          </p:nvSpPr>
+          <p:spPr>
+            <a:xfrm>
+              <a:off x="701519" y="4124610"/>
+              <a:ext cx="3856714" cy="450000"/>
+            </a:xfrm>
+            <a:prstGeom prst="rect">
+              <a:avLst/>
+            </a:prstGeom>
+            <a:solidFill>
+              <a:srgbClr val="FF0000"/>
+            </a:solidFill>
+          </p:spPr>
+          <p:style>
+            <a:lnRef idx="2">
+              <a:schemeClr val="accent1">
+                <a:shade val="50000"/>
+              </a:schemeClr>
+            </a:lnRef>
+            <a:fillRef idx="1">
+              <a:schemeClr val="accent1"/>
+            </a:fillRef>
+            <a:effectRef idx="0">
+              <a:schemeClr val="accent1"/>
+            </a:effectRef>
+            <a:fontRef idx="minor">
+              <a:schemeClr val="lt1"/>
+            </a:fontRef>
+          </p:style>
+          <p:txBody>
+            <a:bodyPr rtlCol="0" anchor="ctr"/>
+            <a:lstStyle/>
+            <a:p>
+              <a:pPr algn="ctr"/>
+              <a:r>
+                <a:rPr lang="fr-FR" dirty="0" smtClean="0"/>
+                <a:t>Mathématiques </a:t>
+              </a:r>
+              <a:endParaRPr lang="fr-FR" dirty="0"/>
+            </a:p>
+          </p:txBody>
+        </p:sp>
+        <p:sp>
+          <p:nvSpPr>
+            <p:cNvPr id="18" name="Rectangle 17"/>
+            <p:cNvSpPr/>
+            <p:nvPr/>
+          </p:nvSpPr>
+          <p:spPr>
+            <a:xfrm>
+              <a:off x="701519" y="4574610"/>
+              <a:ext cx="2571143" cy="450000"/>
+            </a:xfrm>
+            <a:prstGeom prst="rect">
+              <a:avLst/>
+            </a:prstGeom>
+            <a:solidFill>
+              <a:srgbClr val="00B050"/>
+            </a:solidFill>
+          </p:spPr>
+          <p:style>
+            <a:lnRef idx="2">
+              <a:schemeClr val="accent1">
+                <a:shade val="50000"/>
+              </a:schemeClr>
+            </a:lnRef>
+            <a:fillRef idx="1">
+              <a:schemeClr val="accent1"/>
+            </a:fillRef>
+            <a:effectRef idx="0">
+              <a:schemeClr val="accent1"/>
+            </a:effectRef>
+            <a:fontRef idx="minor">
+              <a:schemeClr val="lt1"/>
+            </a:fontRef>
+          </p:style>
+          <p:txBody>
+            <a:bodyPr rtlCol="0" anchor="ctr"/>
+            <a:lstStyle/>
+            <a:p>
+              <a:pPr algn="ctr"/>
+              <a:r>
+                <a:rPr lang="fr-FR" dirty="0" smtClean="0"/>
+                <a:t>Physique-Chimie</a:t>
+              </a:r>
+              <a:endParaRPr lang="fr-FR" dirty="0"/>
+            </a:p>
+          </p:txBody>
+        </p:sp>
+        <p:sp>
+          <p:nvSpPr>
+            <p:cNvPr id="19" name="Rectangle 18"/>
+            <p:cNvSpPr/>
+            <p:nvPr/>
+          </p:nvSpPr>
+          <p:spPr>
+            <a:xfrm>
+              <a:off x="701519" y="5024610"/>
+              <a:ext cx="642786" cy="450000"/>
+            </a:xfrm>
+            <a:prstGeom prst="rect">
+              <a:avLst/>
+            </a:prstGeom>
+            <a:solidFill>
+              <a:srgbClr val="00B0F0"/>
+            </a:solidFill>
+          </p:spPr>
+          <p:style>
+            <a:lnRef idx="2">
+              <a:schemeClr val="accent1">
+                <a:shade val="50000"/>
+              </a:schemeClr>
+            </a:lnRef>
+            <a:fillRef idx="1">
+              <a:schemeClr val="accent1"/>
+            </a:fillRef>
+            <a:effectRef idx="0">
+              <a:schemeClr val="accent1"/>
+            </a:effectRef>
+            <a:fontRef idx="minor">
+              <a:schemeClr val="lt1"/>
+            </a:fontRef>
+          </p:style>
+          <p:txBody>
+            <a:bodyPr rtlCol="0" anchor="ctr"/>
+            <a:lstStyle/>
+            <a:p>
+              <a:pPr algn="ctr"/>
+              <a:r>
+                <a:rPr lang="fr-FR" dirty="0" smtClean="0"/>
+                <a:t>SII</a:t>
+              </a:r>
+              <a:endParaRPr lang="fr-FR" dirty="0"/>
+            </a:p>
+          </p:txBody>
+        </p:sp>
+        <p:sp>
+          <p:nvSpPr>
+            <p:cNvPr id="20" name="Rectangle 19"/>
+            <p:cNvSpPr/>
+            <p:nvPr/>
+          </p:nvSpPr>
+          <p:spPr>
+            <a:xfrm>
+              <a:off x="701519" y="5474610"/>
+              <a:ext cx="1285571" cy="450000"/>
+            </a:xfrm>
+            <a:prstGeom prst="rect">
+              <a:avLst/>
+            </a:prstGeom>
+            <a:solidFill>
+              <a:srgbClr val="FFC000"/>
+            </a:solidFill>
+          </p:spPr>
+          <p:style>
+            <a:lnRef idx="2">
+              <a:schemeClr val="accent1">
+                <a:shade val="50000"/>
+              </a:schemeClr>
+            </a:lnRef>
+            <a:fillRef idx="1">
+              <a:schemeClr val="accent1"/>
+            </a:fillRef>
+            <a:effectRef idx="0">
+              <a:schemeClr val="accent1"/>
+            </a:effectRef>
+            <a:fontRef idx="minor">
+              <a:schemeClr val="lt1"/>
+            </a:fontRef>
+          </p:style>
+          <p:txBody>
+            <a:bodyPr rtlCol="0" anchor="ctr"/>
+            <a:lstStyle/>
+            <a:p>
+              <a:pPr algn="ctr"/>
+              <a:r>
+                <a:rPr lang="fr-FR" sz="1600" dirty="0" smtClean="0">
+                  <a:solidFill>
+                    <a:schemeClr val="tx1"/>
+                  </a:solidFill>
+                </a:rPr>
+                <a:t>Lettres + LV</a:t>
+              </a:r>
+              <a:endParaRPr lang="fr-FR" sz="1600" dirty="0">
                 <a:solidFill>
                   <a:schemeClr val="tx1"/>
                 </a:solidFill>
-              </a:rPr>
-              <a:t>Lettres + LV</a:t>
-            </a:r>
-            <a:endParaRPr lang="fr-FR" sz="1600" dirty="0">
-              <a:solidFill>
-                <a:schemeClr val="tx1"/>
-              </a:solidFill>
-            </a:endParaRPr>
-          </a:p>
-        </p:txBody>
-      </p:sp>
-      <p:sp>
-        <p:nvSpPr>
-          <p:cNvPr id="21" name="Rectangle 20"/>
-          <p:cNvSpPr/>
+              </a:endParaRPr>
+            </a:p>
+          </p:txBody>
+        </p:sp>
+        <p:sp>
+          <p:nvSpPr>
+            <p:cNvPr id="21" name="Rectangle 20"/>
+            <p:cNvSpPr/>
+            <p:nvPr/>
+          </p:nvSpPr>
+          <p:spPr>
+            <a:xfrm rot="16200000">
+              <a:off x="-423481" y="4799610"/>
+              <a:ext cx="1800000" cy="450000"/>
+            </a:xfrm>
+            <a:prstGeom prst="rect">
+              <a:avLst/>
+            </a:prstGeom>
+          </p:spPr>
+          <p:style>
+            <a:lnRef idx="2">
+              <a:schemeClr val="accent1">
+                <a:shade val="50000"/>
+              </a:schemeClr>
+            </a:lnRef>
+            <a:fillRef idx="1">
+              <a:schemeClr val="accent1"/>
+            </a:fillRef>
+            <a:effectRef idx="0">
+              <a:schemeClr val="accent1"/>
+            </a:effectRef>
+            <a:fontRef idx="minor">
+              <a:schemeClr val="lt1"/>
+            </a:fontRef>
+          </p:style>
+          <p:txBody>
+            <a:bodyPr rtlCol="0" anchor="ctr"/>
+            <a:lstStyle/>
+            <a:p>
+              <a:pPr algn="ctr"/>
+              <a:r>
+                <a:rPr lang="fr-FR" sz="2400" b="1" dirty="0" smtClean="0"/>
+                <a:t>MPSI</a:t>
+              </a:r>
+              <a:endParaRPr lang="fr-FR" sz="2400" b="1" dirty="0"/>
+            </a:p>
+          </p:txBody>
+        </p:sp>
+      </p:grpSp>
+      <p:grpSp>
+        <p:nvGrpSpPr>
+          <p:cNvPr id="6" name="Groupe 5"/>
+          <p:cNvGrpSpPr/>
           <p:nvPr/>
-        </p:nvSpPr>
-        <p:spPr>
-          <a:xfrm rot="16200000">
-            <a:off x="-423481" y="4799610"/>
-            <a:ext cx="1800000" cy="450000"/>
+        </p:nvGrpSpPr>
+        <p:grpSpPr>
+          <a:xfrm>
+            <a:off x="4762266" y="1493758"/>
+            <a:ext cx="4306714" cy="1800000"/>
+            <a:chOff x="4762266" y="1493758"/>
+            <a:chExt cx="4306714" cy="1800000"/>
           </a:xfrm>
-          <a:prstGeom prst="rect">
-            <a:avLst/>
-          </a:prstGeom>
-        </p:spPr>
-        <p:style>
-          <a:lnRef idx="2">
-            <a:schemeClr val="accent1">
-              <a:shade val="50000"/>
-            </a:schemeClr>
-          </a:lnRef>
-          <a:fillRef idx="1">
-            <a:schemeClr val="accent1"/>
-          </a:fillRef>
-          <a:effectRef idx="0">
-            <a:schemeClr val="accent1"/>
-          </a:effectRef>
-          <a:fontRef idx="minor">
-            <a:schemeClr val="lt1"/>
-          </a:fontRef>
-        </p:style>
-        <p:txBody>
-          <a:bodyPr rtlCol="0" anchor="ctr"/>
-          <a:lstStyle/>
-          <a:p>
-            <a:pPr algn="ctr"/>
-            <a:r>
-              <a:rPr lang="fr-FR" sz="2400" b="1" dirty="0" smtClean="0"/>
-              <a:t>MPSI</a:t>
-            </a:r>
-            <a:endParaRPr lang="fr-FR" sz="2400" b="1" dirty="0"/>
-          </a:p>
-        </p:txBody>
-      </p:sp>
-      <p:sp>
-        <p:nvSpPr>
-          <p:cNvPr id="24" name="Rectangle 23"/>
-          <p:cNvSpPr/>
-          <p:nvPr/>
-        </p:nvSpPr>
-        <p:spPr>
-          <a:xfrm>
-            <a:off x="5212266" y="1493758"/>
-            <a:ext cx="3213928" cy="450000"/>
-          </a:xfrm>
-          <a:prstGeom prst="rect">
-            <a:avLst/>
-          </a:prstGeom>
-          <a:solidFill>
-            <a:srgbClr val="FF0000"/>
-          </a:solidFill>
-        </p:spPr>
-        <p:style>
-          <a:lnRef idx="2">
-            <a:schemeClr val="accent1">
-              <a:shade val="50000"/>
-            </a:schemeClr>
-          </a:lnRef>
-          <a:fillRef idx="1">
-            <a:schemeClr val="accent1"/>
-          </a:fillRef>
-          <a:effectRef idx="0">
-            <a:schemeClr val="accent1"/>
-          </a:effectRef>
-          <a:fontRef idx="minor">
-            <a:schemeClr val="lt1"/>
-          </a:fontRef>
-        </p:style>
-        <p:txBody>
-          <a:bodyPr rtlCol="0" anchor="ctr"/>
-          <a:lstStyle/>
-          <a:p>
-            <a:pPr algn="ctr"/>
-            <a:r>
-              <a:rPr lang="fr-FR" sz="1600" dirty="0" smtClean="0"/>
-              <a:t>Mathématiques </a:t>
-            </a:r>
-            <a:endParaRPr lang="fr-FR" sz="1600" dirty="0"/>
-          </a:p>
-        </p:txBody>
-      </p:sp>
-      <p:sp>
-        <p:nvSpPr>
-          <p:cNvPr id="25" name="Rectangle 24"/>
-          <p:cNvSpPr/>
-          <p:nvPr/>
-        </p:nvSpPr>
-        <p:spPr>
-          <a:xfrm>
-            <a:off x="5212266" y="1943758"/>
-            <a:ext cx="3856714" cy="450000"/>
-          </a:xfrm>
-          <a:prstGeom prst="rect">
-            <a:avLst/>
-          </a:prstGeom>
-          <a:solidFill>
-            <a:srgbClr val="00B050"/>
-          </a:solidFill>
-        </p:spPr>
-        <p:style>
-          <a:lnRef idx="2">
-            <a:schemeClr val="accent1">
-              <a:shade val="50000"/>
-            </a:schemeClr>
-          </a:lnRef>
-          <a:fillRef idx="1">
-            <a:schemeClr val="accent1"/>
-          </a:fillRef>
-          <a:effectRef idx="0">
-            <a:schemeClr val="accent1"/>
-          </a:effectRef>
-          <a:fontRef idx="minor">
-            <a:schemeClr val="lt1"/>
-          </a:fontRef>
-        </p:style>
-        <p:txBody>
-          <a:bodyPr rtlCol="0" anchor="ctr"/>
-          <a:lstStyle/>
-          <a:p>
-            <a:pPr algn="ctr"/>
-            <a:r>
-              <a:rPr lang="fr-FR" sz="1600" dirty="0" smtClean="0"/>
-              <a:t>Physique-Chimie</a:t>
-            </a:r>
-            <a:endParaRPr lang="fr-FR" sz="1600" dirty="0"/>
-          </a:p>
-        </p:txBody>
-      </p:sp>
-      <p:sp>
-        <p:nvSpPr>
-          <p:cNvPr id="26" name="Rectangle 25"/>
-          <p:cNvSpPr/>
-          <p:nvPr/>
-        </p:nvSpPr>
-        <p:spPr>
-          <a:xfrm>
-            <a:off x="5212266" y="2393758"/>
-            <a:ext cx="1285571" cy="450000"/>
-          </a:xfrm>
-          <a:prstGeom prst="rect">
-            <a:avLst/>
-          </a:prstGeom>
-          <a:solidFill>
-            <a:srgbClr val="00B0F0"/>
-          </a:solidFill>
-        </p:spPr>
-        <p:style>
-          <a:lnRef idx="2">
-            <a:schemeClr val="accent1">
-              <a:shade val="50000"/>
-            </a:schemeClr>
-          </a:lnRef>
-          <a:fillRef idx="1">
-            <a:schemeClr val="accent1"/>
-          </a:fillRef>
-          <a:effectRef idx="0">
-            <a:schemeClr val="accent1"/>
-          </a:effectRef>
-          <a:fontRef idx="minor">
-            <a:schemeClr val="lt1"/>
-          </a:fontRef>
-        </p:style>
-        <p:txBody>
-          <a:bodyPr rtlCol="0" anchor="ctr"/>
-          <a:lstStyle/>
-          <a:p>
-            <a:pPr algn="ctr"/>
-            <a:r>
-              <a:rPr lang="fr-FR" sz="1600" dirty="0" smtClean="0"/>
-              <a:t>SII</a:t>
-            </a:r>
-            <a:endParaRPr lang="fr-FR" sz="1600" dirty="0"/>
-          </a:p>
-        </p:txBody>
-      </p:sp>
-      <p:sp>
-        <p:nvSpPr>
-          <p:cNvPr id="27" name="Rectangle 26"/>
-          <p:cNvSpPr/>
-          <p:nvPr/>
-        </p:nvSpPr>
-        <p:spPr>
-          <a:xfrm>
-            <a:off x="5212266" y="2843758"/>
-            <a:ext cx="1285571" cy="450000"/>
-          </a:xfrm>
-          <a:prstGeom prst="rect">
-            <a:avLst/>
-          </a:prstGeom>
-          <a:solidFill>
-            <a:srgbClr val="FFC000"/>
-          </a:solidFill>
-        </p:spPr>
-        <p:style>
-          <a:lnRef idx="2">
-            <a:schemeClr val="accent1">
-              <a:shade val="50000"/>
-            </a:schemeClr>
-          </a:lnRef>
-          <a:fillRef idx="1">
-            <a:schemeClr val="accent1"/>
-          </a:fillRef>
-          <a:effectRef idx="0">
-            <a:schemeClr val="accent1"/>
-          </a:effectRef>
-          <a:fontRef idx="minor">
-            <a:schemeClr val="lt1"/>
-          </a:fontRef>
-        </p:style>
-        <p:txBody>
-          <a:bodyPr rtlCol="0" anchor="ctr"/>
-          <a:lstStyle/>
-          <a:p>
-            <a:pPr algn="ctr"/>
-            <a:r>
-              <a:rPr lang="fr-FR" sz="1600" dirty="0" smtClean="0">
+        </p:grpSpPr>
+        <p:sp>
+          <p:nvSpPr>
+            <p:cNvPr id="24" name="Rectangle 23"/>
+            <p:cNvSpPr/>
+            <p:nvPr/>
+          </p:nvSpPr>
+          <p:spPr>
+            <a:xfrm>
+              <a:off x="5212266" y="1493758"/>
+              <a:ext cx="3213928" cy="450000"/>
+            </a:xfrm>
+            <a:prstGeom prst="rect">
+              <a:avLst/>
+            </a:prstGeom>
+            <a:solidFill>
+              <a:srgbClr val="FF0000"/>
+            </a:solidFill>
+          </p:spPr>
+          <p:style>
+            <a:lnRef idx="2">
+              <a:schemeClr val="accent1">
+                <a:shade val="50000"/>
+              </a:schemeClr>
+            </a:lnRef>
+            <a:fillRef idx="1">
+              <a:schemeClr val="accent1"/>
+            </a:fillRef>
+            <a:effectRef idx="0">
+              <a:schemeClr val="accent1"/>
+            </a:effectRef>
+            <a:fontRef idx="minor">
+              <a:schemeClr val="lt1"/>
+            </a:fontRef>
+          </p:style>
+          <p:txBody>
+            <a:bodyPr rtlCol="0" anchor="ctr"/>
+            <a:lstStyle/>
+            <a:p>
+              <a:pPr algn="ctr"/>
+              <a:r>
+                <a:rPr lang="fr-FR" sz="1600" dirty="0" smtClean="0"/>
+                <a:t>Mathématiques </a:t>
+              </a:r>
+              <a:endParaRPr lang="fr-FR" sz="1600" dirty="0"/>
+            </a:p>
+          </p:txBody>
+        </p:sp>
+        <p:sp>
+          <p:nvSpPr>
+            <p:cNvPr id="25" name="Rectangle 24"/>
+            <p:cNvSpPr/>
+            <p:nvPr/>
+          </p:nvSpPr>
+          <p:spPr>
+            <a:xfrm>
+              <a:off x="5212266" y="1943758"/>
+              <a:ext cx="2571143" cy="450000"/>
+            </a:xfrm>
+            <a:prstGeom prst="rect">
+              <a:avLst/>
+            </a:prstGeom>
+            <a:solidFill>
+              <a:srgbClr val="00B050"/>
+            </a:solidFill>
+          </p:spPr>
+          <p:style>
+            <a:lnRef idx="2">
+              <a:schemeClr val="accent1">
+                <a:shade val="50000"/>
+              </a:schemeClr>
+            </a:lnRef>
+            <a:fillRef idx="1">
+              <a:schemeClr val="accent1"/>
+            </a:fillRef>
+            <a:effectRef idx="0">
+              <a:schemeClr val="accent1"/>
+            </a:effectRef>
+            <a:fontRef idx="minor">
+              <a:schemeClr val="lt1"/>
+            </a:fontRef>
+          </p:style>
+          <p:txBody>
+            <a:bodyPr rtlCol="0" anchor="ctr"/>
+            <a:lstStyle/>
+            <a:p>
+              <a:pPr algn="ctr"/>
+              <a:r>
+                <a:rPr lang="fr-FR" sz="1600" dirty="0" smtClean="0"/>
+                <a:t>Physique</a:t>
+              </a:r>
+              <a:endParaRPr lang="fr-FR" sz="1600" dirty="0"/>
+            </a:p>
+          </p:txBody>
+        </p:sp>
+        <p:sp>
+          <p:nvSpPr>
+            <p:cNvPr id="26" name="Rectangle 25"/>
+            <p:cNvSpPr/>
+            <p:nvPr/>
+          </p:nvSpPr>
+          <p:spPr>
+            <a:xfrm>
+              <a:off x="5212266" y="2393758"/>
+              <a:ext cx="1285571" cy="450000"/>
+            </a:xfrm>
+            <a:prstGeom prst="rect">
+              <a:avLst/>
+            </a:prstGeom>
+            <a:solidFill>
+              <a:srgbClr val="00B0F0"/>
+            </a:solidFill>
+          </p:spPr>
+          <p:style>
+            <a:lnRef idx="2">
+              <a:schemeClr val="accent1">
+                <a:shade val="50000"/>
+              </a:schemeClr>
+            </a:lnRef>
+            <a:fillRef idx="1">
+              <a:schemeClr val="accent1"/>
+            </a:fillRef>
+            <a:effectRef idx="0">
+              <a:schemeClr val="accent1"/>
+            </a:effectRef>
+            <a:fontRef idx="minor">
+              <a:schemeClr val="lt1"/>
+            </a:fontRef>
+          </p:style>
+          <p:txBody>
+            <a:bodyPr rtlCol="0" anchor="ctr"/>
+            <a:lstStyle/>
+            <a:p>
+              <a:pPr algn="ctr"/>
+              <a:r>
+                <a:rPr lang="fr-FR" sz="1600" dirty="0" smtClean="0"/>
+                <a:t>SII</a:t>
+              </a:r>
+              <a:endParaRPr lang="fr-FR" sz="1600" dirty="0"/>
+            </a:p>
+          </p:txBody>
+        </p:sp>
+        <p:sp>
+          <p:nvSpPr>
+            <p:cNvPr id="27" name="Rectangle 26"/>
+            <p:cNvSpPr/>
+            <p:nvPr/>
+          </p:nvSpPr>
+          <p:spPr>
+            <a:xfrm>
+              <a:off x="5212266" y="2843758"/>
+              <a:ext cx="1285571" cy="450000"/>
+            </a:xfrm>
+            <a:prstGeom prst="rect">
+              <a:avLst/>
+            </a:prstGeom>
+            <a:solidFill>
+              <a:srgbClr val="FFC000"/>
+            </a:solidFill>
+          </p:spPr>
+          <p:style>
+            <a:lnRef idx="2">
+              <a:schemeClr val="accent1">
+                <a:shade val="50000"/>
+              </a:schemeClr>
+            </a:lnRef>
+            <a:fillRef idx="1">
+              <a:schemeClr val="accent1"/>
+            </a:fillRef>
+            <a:effectRef idx="0">
+              <a:schemeClr val="accent1"/>
+            </a:effectRef>
+            <a:fontRef idx="minor">
+              <a:schemeClr val="lt1"/>
+            </a:fontRef>
+          </p:style>
+          <p:txBody>
+            <a:bodyPr rtlCol="0" anchor="ctr"/>
+            <a:lstStyle/>
+            <a:p>
+              <a:pPr algn="ctr"/>
+              <a:r>
+                <a:rPr lang="fr-FR" sz="1600" dirty="0" smtClean="0">
+                  <a:solidFill>
+                    <a:schemeClr val="tx1"/>
+                  </a:solidFill>
+                </a:rPr>
+                <a:t>Lettres + LV</a:t>
+              </a:r>
+              <a:endParaRPr lang="fr-FR" sz="1600" dirty="0">
                 <a:solidFill>
                   <a:schemeClr val="tx1"/>
                 </a:solidFill>
-              </a:rPr>
-              <a:t>Lettres + LV</a:t>
-            </a:r>
-            <a:endParaRPr lang="fr-FR" sz="1600" dirty="0">
-              <a:solidFill>
-                <a:schemeClr val="tx1"/>
-              </a:solidFill>
-            </a:endParaRPr>
-          </a:p>
-        </p:txBody>
-      </p:sp>
-      <p:sp>
-        <p:nvSpPr>
-          <p:cNvPr id="28" name="Rectangle 27"/>
-          <p:cNvSpPr/>
+              </a:endParaRPr>
+            </a:p>
+          </p:txBody>
+        </p:sp>
+        <p:sp>
+          <p:nvSpPr>
+            <p:cNvPr id="28" name="Rectangle 27"/>
+            <p:cNvSpPr/>
+            <p:nvPr/>
+          </p:nvSpPr>
+          <p:spPr>
+            <a:xfrm rot="16200000">
+              <a:off x="4087266" y="2168758"/>
+              <a:ext cx="1800000" cy="450000"/>
+            </a:xfrm>
+            <a:prstGeom prst="rect">
+              <a:avLst/>
+            </a:prstGeom>
+          </p:spPr>
+          <p:style>
+            <a:lnRef idx="2">
+              <a:schemeClr val="accent1">
+                <a:shade val="50000"/>
+              </a:schemeClr>
+            </a:lnRef>
+            <a:fillRef idx="1">
+              <a:schemeClr val="accent1"/>
+            </a:fillRef>
+            <a:effectRef idx="0">
+              <a:schemeClr val="accent1"/>
+            </a:effectRef>
+            <a:fontRef idx="minor">
+              <a:schemeClr val="lt1"/>
+            </a:fontRef>
+          </p:style>
+          <p:txBody>
+            <a:bodyPr rtlCol="0" anchor="ctr"/>
+            <a:lstStyle/>
+            <a:p>
+              <a:pPr algn="ctr"/>
+              <a:r>
+                <a:rPr lang="fr-FR" sz="2400" b="1" dirty="0" smtClean="0"/>
+                <a:t>PCSI</a:t>
+              </a:r>
+              <a:endParaRPr lang="fr-FR" sz="2400" b="1" dirty="0"/>
+            </a:p>
+          </p:txBody>
+        </p:sp>
+        <p:sp>
+          <p:nvSpPr>
+            <p:cNvPr id="29" name="Rectangle 28"/>
+            <p:cNvSpPr/>
+            <p:nvPr/>
+          </p:nvSpPr>
+          <p:spPr>
+            <a:xfrm>
+              <a:off x="7783409" y="1943760"/>
+              <a:ext cx="1285571" cy="450000"/>
+            </a:xfrm>
+            <a:prstGeom prst="rect">
+              <a:avLst/>
+            </a:prstGeom>
+            <a:solidFill>
+              <a:srgbClr val="00B050"/>
+            </a:solidFill>
+          </p:spPr>
+          <p:style>
+            <a:lnRef idx="2">
+              <a:schemeClr val="accent1">
+                <a:shade val="50000"/>
+              </a:schemeClr>
+            </a:lnRef>
+            <a:fillRef idx="1">
+              <a:schemeClr val="accent1"/>
+            </a:fillRef>
+            <a:effectRef idx="0">
+              <a:schemeClr val="accent1"/>
+            </a:effectRef>
+            <a:fontRef idx="minor">
+              <a:schemeClr val="lt1"/>
+            </a:fontRef>
+          </p:style>
+          <p:txBody>
+            <a:bodyPr rtlCol="0" anchor="ctr"/>
+            <a:lstStyle/>
+            <a:p>
+              <a:pPr algn="ctr"/>
+              <a:r>
+                <a:rPr lang="fr-FR" sz="1600" dirty="0" smtClean="0"/>
+                <a:t>Chimie</a:t>
+              </a:r>
+              <a:endParaRPr lang="fr-FR" sz="1600" dirty="0"/>
+            </a:p>
+          </p:txBody>
+        </p:sp>
+      </p:grpSp>
+      <p:grpSp>
+        <p:nvGrpSpPr>
+          <p:cNvPr id="8" name="Groupe 7"/>
+          <p:cNvGrpSpPr/>
           <p:nvPr/>
-        </p:nvSpPr>
-        <p:spPr>
-          <a:xfrm rot="16200000">
-            <a:off x="4087266" y="2168758"/>
-            <a:ext cx="1800000" cy="450000"/>
+        </p:nvGrpSpPr>
+        <p:grpSpPr>
+          <a:xfrm>
+            <a:off x="4762266" y="4124610"/>
+            <a:ext cx="3021143" cy="1800000"/>
+            <a:chOff x="4762266" y="4124610"/>
+            <a:chExt cx="3021143" cy="1800000"/>
           </a:xfrm>
-          <a:prstGeom prst="rect">
-            <a:avLst/>
-          </a:prstGeom>
-        </p:spPr>
-        <p:style>
-          <a:lnRef idx="2">
-            <a:schemeClr val="accent1">
-              <a:shade val="50000"/>
-            </a:schemeClr>
-          </a:lnRef>
-          <a:fillRef idx="1">
-            <a:schemeClr val="accent1"/>
-          </a:fillRef>
-          <a:effectRef idx="0">
-            <a:schemeClr val="accent1"/>
-          </a:effectRef>
-          <a:fontRef idx="minor">
-            <a:schemeClr val="lt1"/>
-          </a:fontRef>
-        </p:style>
-        <p:txBody>
-          <a:bodyPr rtlCol="0" anchor="ctr"/>
-          <a:lstStyle/>
-          <a:p>
-            <a:pPr algn="ctr"/>
-            <a:r>
-              <a:rPr lang="fr-FR" sz="2400" b="1" dirty="0" smtClean="0"/>
-              <a:t>PCSI</a:t>
-            </a:r>
-            <a:endParaRPr lang="fr-FR" sz="2400" b="1" dirty="0"/>
-          </a:p>
-        </p:txBody>
-      </p:sp>
-      <p:sp>
-        <p:nvSpPr>
-          <p:cNvPr id="30" name="Rectangle 29"/>
-          <p:cNvSpPr/>
-          <p:nvPr/>
-        </p:nvSpPr>
-        <p:spPr>
-          <a:xfrm>
-            <a:off x="5212266" y="4124610"/>
-            <a:ext cx="2571143" cy="450000"/>
-          </a:xfrm>
-          <a:prstGeom prst="rect">
-            <a:avLst/>
-          </a:prstGeom>
-          <a:solidFill>
-            <a:srgbClr val="FF0000"/>
-          </a:solidFill>
-        </p:spPr>
-        <p:style>
-          <a:lnRef idx="2">
-            <a:schemeClr val="accent1">
-              <a:shade val="50000"/>
-            </a:schemeClr>
-          </a:lnRef>
-          <a:fillRef idx="1">
-            <a:schemeClr val="accent1"/>
-          </a:fillRef>
-          <a:effectRef idx="0">
-            <a:schemeClr val="accent1"/>
-          </a:effectRef>
-          <a:fontRef idx="minor">
-            <a:schemeClr val="lt1"/>
-          </a:fontRef>
-        </p:style>
-        <p:txBody>
-          <a:bodyPr rtlCol="0" anchor="ctr"/>
-          <a:lstStyle/>
-          <a:p>
-            <a:pPr algn="ctr"/>
-            <a:r>
-              <a:rPr lang="fr-FR" dirty="0" smtClean="0"/>
-              <a:t>Mathématiques </a:t>
-            </a:r>
-            <a:endParaRPr lang="fr-FR" dirty="0"/>
-          </a:p>
-        </p:txBody>
-      </p:sp>
-      <p:sp>
-        <p:nvSpPr>
-          <p:cNvPr id="31" name="Rectangle 30"/>
-          <p:cNvSpPr/>
-          <p:nvPr/>
-        </p:nvSpPr>
-        <p:spPr>
-          <a:xfrm>
-            <a:off x="5212266" y="4574610"/>
-            <a:ext cx="2249750" cy="450000"/>
-          </a:xfrm>
-          <a:prstGeom prst="rect">
-            <a:avLst/>
-          </a:prstGeom>
-          <a:solidFill>
-            <a:srgbClr val="00B050"/>
-          </a:solidFill>
-        </p:spPr>
-        <p:style>
-          <a:lnRef idx="2">
-            <a:schemeClr val="accent1">
-              <a:shade val="50000"/>
-            </a:schemeClr>
-          </a:lnRef>
-          <a:fillRef idx="1">
-            <a:schemeClr val="accent1"/>
-          </a:fillRef>
-          <a:effectRef idx="0">
-            <a:schemeClr val="accent1"/>
-          </a:effectRef>
-          <a:fontRef idx="minor">
-            <a:schemeClr val="lt1"/>
-          </a:fontRef>
-        </p:style>
-        <p:txBody>
-          <a:bodyPr rtlCol="0" anchor="ctr"/>
-          <a:lstStyle/>
-          <a:p>
-            <a:pPr algn="ctr"/>
-            <a:r>
-              <a:rPr lang="fr-FR" dirty="0" smtClean="0"/>
-              <a:t>Physique-Chimie</a:t>
-            </a:r>
-            <a:endParaRPr lang="fr-FR" dirty="0"/>
-          </a:p>
-        </p:txBody>
-      </p:sp>
-      <p:sp>
-        <p:nvSpPr>
-          <p:cNvPr id="32" name="Rectangle 31"/>
-          <p:cNvSpPr/>
-          <p:nvPr/>
-        </p:nvSpPr>
-        <p:spPr>
-          <a:xfrm>
-            <a:off x="5212266" y="5024610"/>
-            <a:ext cx="2571143" cy="450000"/>
-          </a:xfrm>
-          <a:prstGeom prst="rect">
-            <a:avLst/>
-          </a:prstGeom>
-          <a:solidFill>
-            <a:srgbClr val="00B0F0"/>
-          </a:solidFill>
-        </p:spPr>
-        <p:style>
-          <a:lnRef idx="2">
-            <a:schemeClr val="accent1">
-              <a:shade val="50000"/>
-            </a:schemeClr>
-          </a:lnRef>
-          <a:fillRef idx="1">
-            <a:schemeClr val="accent1"/>
-          </a:fillRef>
-          <a:effectRef idx="0">
-            <a:schemeClr val="accent1"/>
-          </a:effectRef>
-          <a:fontRef idx="minor">
-            <a:schemeClr val="lt1"/>
-          </a:fontRef>
-        </p:style>
-        <p:txBody>
-          <a:bodyPr rtlCol="0" anchor="ctr"/>
-          <a:lstStyle/>
-          <a:p>
-            <a:pPr algn="ctr"/>
-            <a:r>
-              <a:rPr lang="fr-FR" dirty="0" smtClean="0"/>
-              <a:t>Biologie - Géologie</a:t>
-            </a:r>
-            <a:endParaRPr lang="fr-FR" dirty="0"/>
-          </a:p>
-        </p:txBody>
-      </p:sp>
-      <p:sp>
-        <p:nvSpPr>
-          <p:cNvPr id="33" name="Rectangle 32"/>
-          <p:cNvSpPr/>
-          <p:nvPr/>
-        </p:nvSpPr>
-        <p:spPr>
-          <a:xfrm>
-            <a:off x="5212266" y="5474610"/>
-            <a:ext cx="1285571" cy="450000"/>
-          </a:xfrm>
-          <a:prstGeom prst="rect">
-            <a:avLst/>
-          </a:prstGeom>
-          <a:solidFill>
-            <a:srgbClr val="FFC000"/>
-          </a:solidFill>
-        </p:spPr>
-        <p:style>
-          <a:lnRef idx="2">
-            <a:schemeClr val="accent1">
-              <a:shade val="50000"/>
-            </a:schemeClr>
-          </a:lnRef>
-          <a:fillRef idx="1">
-            <a:schemeClr val="accent1"/>
-          </a:fillRef>
-          <a:effectRef idx="0">
-            <a:schemeClr val="accent1"/>
-          </a:effectRef>
-          <a:fontRef idx="minor">
-            <a:schemeClr val="lt1"/>
-          </a:fontRef>
-        </p:style>
-        <p:txBody>
-          <a:bodyPr rtlCol="0" anchor="ctr"/>
-          <a:lstStyle/>
-          <a:p>
-            <a:pPr algn="ctr"/>
-            <a:r>
-              <a:rPr lang="fr-FR" sz="1600" dirty="0" smtClean="0">
+        </p:grpSpPr>
+        <p:sp>
+          <p:nvSpPr>
+            <p:cNvPr id="30" name="Rectangle 29"/>
+            <p:cNvSpPr/>
+            <p:nvPr/>
+          </p:nvSpPr>
+          <p:spPr>
+            <a:xfrm>
+              <a:off x="5212266" y="4124610"/>
+              <a:ext cx="2571143" cy="450000"/>
+            </a:xfrm>
+            <a:prstGeom prst="rect">
+              <a:avLst/>
+            </a:prstGeom>
+            <a:solidFill>
+              <a:srgbClr val="FF0000"/>
+            </a:solidFill>
+          </p:spPr>
+          <p:style>
+            <a:lnRef idx="2">
+              <a:schemeClr val="accent1">
+                <a:shade val="50000"/>
+              </a:schemeClr>
+            </a:lnRef>
+            <a:fillRef idx="1">
+              <a:schemeClr val="accent1"/>
+            </a:fillRef>
+            <a:effectRef idx="0">
+              <a:schemeClr val="accent1"/>
+            </a:effectRef>
+            <a:fontRef idx="minor">
+              <a:schemeClr val="lt1"/>
+            </a:fontRef>
+          </p:style>
+          <p:txBody>
+            <a:bodyPr rtlCol="0" anchor="ctr"/>
+            <a:lstStyle/>
+            <a:p>
+              <a:pPr algn="ctr"/>
+              <a:r>
+                <a:rPr lang="fr-FR" dirty="0" smtClean="0"/>
+                <a:t>Mathématiques </a:t>
+              </a:r>
+              <a:endParaRPr lang="fr-FR" dirty="0"/>
+            </a:p>
+          </p:txBody>
+        </p:sp>
+        <p:sp>
+          <p:nvSpPr>
+            <p:cNvPr id="31" name="Rectangle 30"/>
+            <p:cNvSpPr/>
+            <p:nvPr/>
+          </p:nvSpPr>
+          <p:spPr>
+            <a:xfrm>
+              <a:off x="5212266" y="4574610"/>
+              <a:ext cx="2249750" cy="450000"/>
+            </a:xfrm>
+            <a:prstGeom prst="rect">
+              <a:avLst/>
+            </a:prstGeom>
+            <a:solidFill>
+              <a:srgbClr val="00B050"/>
+            </a:solidFill>
+          </p:spPr>
+          <p:style>
+            <a:lnRef idx="2">
+              <a:schemeClr val="accent1">
+                <a:shade val="50000"/>
+              </a:schemeClr>
+            </a:lnRef>
+            <a:fillRef idx="1">
+              <a:schemeClr val="accent1"/>
+            </a:fillRef>
+            <a:effectRef idx="0">
+              <a:schemeClr val="accent1"/>
+            </a:effectRef>
+            <a:fontRef idx="minor">
+              <a:schemeClr val="lt1"/>
+            </a:fontRef>
+          </p:style>
+          <p:txBody>
+            <a:bodyPr rtlCol="0" anchor="ctr"/>
+            <a:lstStyle/>
+            <a:p>
+              <a:pPr algn="ctr"/>
+              <a:r>
+                <a:rPr lang="fr-FR" dirty="0" smtClean="0"/>
+                <a:t>Physique-Chimie</a:t>
+              </a:r>
+              <a:endParaRPr lang="fr-FR" dirty="0"/>
+            </a:p>
+          </p:txBody>
+        </p:sp>
+        <p:sp>
+          <p:nvSpPr>
+            <p:cNvPr id="32" name="Rectangle 31"/>
+            <p:cNvSpPr/>
+            <p:nvPr/>
+          </p:nvSpPr>
+          <p:spPr>
+            <a:xfrm>
+              <a:off x="5212266" y="5024610"/>
+              <a:ext cx="2571143" cy="450000"/>
+            </a:xfrm>
+            <a:prstGeom prst="rect">
+              <a:avLst/>
+            </a:prstGeom>
+            <a:solidFill>
+              <a:srgbClr val="00B0F0"/>
+            </a:solidFill>
+          </p:spPr>
+          <p:style>
+            <a:lnRef idx="2">
+              <a:schemeClr val="accent1">
+                <a:shade val="50000"/>
+              </a:schemeClr>
+            </a:lnRef>
+            <a:fillRef idx="1">
+              <a:schemeClr val="accent1"/>
+            </a:fillRef>
+            <a:effectRef idx="0">
+              <a:schemeClr val="accent1"/>
+            </a:effectRef>
+            <a:fontRef idx="minor">
+              <a:schemeClr val="lt1"/>
+            </a:fontRef>
+          </p:style>
+          <p:txBody>
+            <a:bodyPr rtlCol="0" anchor="ctr"/>
+            <a:lstStyle/>
+            <a:p>
+              <a:pPr algn="ctr"/>
+              <a:r>
+                <a:rPr lang="fr-FR" dirty="0" smtClean="0"/>
+                <a:t>Biologie - Géologie</a:t>
+              </a:r>
+              <a:endParaRPr lang="fr-FR" dirty="0"/>
+            </a:p>
+          </p:txBody>
+        </p:sp>
+        <p:sp>
+          <p:nvSpPr>
+            <p:cNvPr id="33" name="Rectangle 32"/>
+            <p:cNvSpPr/>
+            <p:nvPr/>
+          </p:nvSpPr>
+          <p:spPr>
+            <a:xfrm>
+              <a:off x="5212266" y="5474610"/>
+              <a:ext cx="1285571" cy="450000"/>
+            </a:xfrm>
+            <a:prstGeom prst="rect">
+              <a:avLst/>
+            </a:prstGeom>
+            <a:solidFill>
+              <a:srgbClr val="FFC000"/>
+            </a:solidFill>
+          </p:spPr>
+          <p:style>
+            <a:lnRef idx="2">
+              <a:schemeClr val="accent1">
+                <a:shade val="50000"/>
+              </a:schemeClr>
+            </a:lnRef>
+            <a:fillRef idx="1">
+              <a:schemeClr val="accent1"/>
+            </a:fillRef>
+            <a:effectRef idx="0">
+              <a:schemeClr val="accent1"/>
+            </a:effectRef>
+            <a:fontRef idx="minor">
+              <a:schemeClr val="lt1"/>
+            </a:fontRef>
+          </p:style>
+          <p:txBody>
+            <a:bodyPr rtlCol="0" anchor="ctr"/>
+            <a:lstStyle/>
+            <a:p>
+              <a:pPr algn="ctr"/>
+              <a:r>
+                <a:rPr lang="fr-FR" sz="1600" dirty="0" smtClean="0">
+                  <a:solidFill>
+                    <a:schemeClr val="tx1"/>
+                  </a:solidFill>
+                </a:rPr>
+                <a:t>Lettres + LV</a:t>
+              </a:r>
+              <a:endParaRPr lang="fr-FR" sz="1600" dirty="0">
                 <a:solidFill>
                   <a:schemeClr val="tx1"/>
                 </a:solidFill>
-              </a:rPr>
-              <a:t>Lettres + LV</a:t>
-            </a:r>
-            <a:endParaRPr lang="fr-FR" sz="1600" dirty="0">
-              <a:solidFill>
-                <a:schemeClr val="tx1"/>
-              </a:solidFill>
-            </a:endParaRPr>
-          </a:p>
-        </p:txBody>
-      </p:sp>
-      <p:sp>
-        <p:nvSpPr>
-          <p:cNvPr id="34" name="Rectangle 33"/>
-          <p:cNvSpPr/>
-          <p:nvPr/>
-        </p:nvSpPr>
-        <p:spPr>
-          <a:xfrm rot="16200000">
-            <a:off x="4087266" y="4799610"/>
-            <a:ext cx="1800000" cy="450000"/>
-          </a:xfrm>
-          <a:prstGeom prst="rect">
-            <a:avLst/>
-          </a:prstGeom>
-        </p:spPr>
-        <p:style>
-          <a:lnRef idx="2">
-            <a:schemeClr val="accent1">
-              <a:shade val="50000"/>
-            </a:schemeClr>
-          </a:lnRef>
-          <a:fillRef idx="1">
-            <a:schemeClr val="accent1"/>
-          </a:fillRef>
-          <a:effectRef idx="0">
-            <a:schemeClr val="accent1"/>
-          </a:effectRef>
-          <a:fontRef idx="minor">
-            <a:schemeClr val="lt1"/>
-          </a:fontRef>
-        </p:style>
-        <p:txBody>
-          <a:bodyPr rtlCol="0" anchor="ctr"/>
-          <a:lstStyle/>
-          <a:p>
-            <a:pPr algn="ctr"/>
-            <a:r>
-              <a:rPr lang="fr-FR" sz="2400" b="1" dirty="0" smtClean="0"/>
-              <a:t>BCPST</a:t>
-            </a:r>
-            <a:endParaRPr lang="fr-FR" sz="2400" b="1" dirty="0"/>
-          </a:p>
-        </p:txBody>
-      </p:sp>
+              </a:endParaRPr>
+            </a:p>
+          </p:txBody>
+        </p:sp>
+        <p:sp>
+          <p:nvSpPr>
+            <p:cNvPr id="34" name="Rectangle 33"/>
+            <p:cNvSpPr/>
+            <p:nvPr/>
+          </p:nvSpPr>
+          <p:spPr>
+            <a:xfrm rot="16200000">
+              <a:off x="4087266" y="4799610"/>
+              <a:ext cx="1800000" cy="450000"/>
+            </a:xfrm>
+            <a:prstGeom prst="rect">
+              <a:avLst/>
+            </a:prstGeom>
+          </p:spPr>
+          <p:style>
+            <a:lnRef idx="2">
+              <a:schemeClr val="accent1">
+                <a:shade val="50000"/>
+              </a:schemeClr>
+            </a:lnRef>
+            <a:fillRef idx="1">
+              <a:schemeClr val="accent1"/>
+            </a:fillRef>
+            <a:effectRef idx="0">
+              <a:schemeClr val="accent1"/>
+            </a:effectRef>
+            <a:fontRef idx="minor">
+              <a:schemeClr val="lt1"/>
+            </a:fontRef>
+          </p:style>
+          <p:txBody>
+            <a:bodyPr rtlCol="0" anchor="ctr"/>
+            <a:lstStyle/>
+            <a:p>
+              <a:pPr algn="ctr"/>
+              <a:r>
+                <a:rPr lang="fr-FR" sz="2400" b="1" dirty="0" smtClean="0"/>
+                <a:t>BCPST</a:t>
+              </a:r>
+              <a:endParaRPr lang="fr-FR" sz="2400" b="1" dirty="0"/>
+            </a:p>
+          </p:txBody>
+        </p:sp>
+      </p:grpSp>
     </p:spTree>
     <p:extLst>
       <p:ext uri="{BB962C8B-B14F-4D97-AF65-F5344CB8AC3E}">
@@ -6706,7 +6814,11 @@
           <a:p>
             <a:pPr lvl="1"/>
             <a:r>
-              <a:rPr lang="fr-FR" dirty="0" smtClean="0"/>
+              <a:rPr lang="fr-FR" b="1" dirty="0" smtClean="0">
+                <a:solidFill>
+                  <a:srgbClr val="FF0000"/>
+                </a:solidFill>
+              </a:rPr>
               <a:t>PO le 17/01/2015</a:t>
             </a:r>
           </a:p>
@@ -6733,6 +6845,310 @@
       </p:par>
     </p:tnLst>
   </p:timing>
+</p:sld>
+</file>
+
+<file path=ppt/slides/slide16.xml><?xml version="1.0" encoding="utf-8"?>
+<p:sld xmlns:a="http://schemas.openxmlformats.org/drawingml/2006/main" xmlns:r="http://schemas.openxmlformats.org/officeDocument/2006/relationships" xmlns:p="http://schemas.openxmlformats.org/presentationml/2006/main">
+  <p:cSld>
+    <p:spTree>
+      <p:nvGrpSpPr>
+        <p:cNvPr id="1" name=""/>
+        <p:cNvGrpSpPr/>
+        <p:nvPr/>
+      </p:nvGrpSpPr>
+      <p:grpSpPr>
+        <a:xfrm>
+          <a:off x="0" y="0"/>
+          <a:ext cx="0" cy="0"/>
+          <a:chOff x="0" y="0"/>
+          <a:chExt cx="0" cy="0"/>
+        </a:xfrm>
+      </p:grpSpPr>
+      <p:sp>
+        <p:nvSpPr>
+          <p:cNvPr id="2" name="Titre 1"/>
+          <p:cNvSpPr>
+            <a:spLocks noGrp="1"/>
+          </p:cNvSpPr>
+          <p:nvPr>
+            <p:ph type="title"/>
+          </p:nvPr>
+        </p:nvSpPr>
+        <p:spPr/>
+        <p:txBody>
+          <a:bodyPr/>
+          <a:lstStyle/>
+          <a:p>
+            <a:r>
+              <a:rPr lang="fr-FR" dirty="0" smtClean="0"/>
+              <a:t>Résultats de la PTSI – PT Rouvière</a:t>
+            </a:r>
+            <a:endParaRPr lang="fr-FR" dirty="0"/>
+          </a:p>
+        </p:txBody>
+      </p:sp>
+      <p:sp>
+        <p:nvSpPr>
+          <p:cNvPr id="3" name="Espace réservé du pied de page 2"/>
+          <p:cNvSpPr>
+            <a:spLocks noGrp="1"/>
+          </p:cNvSpPr>
+          <p:nvPr>
+            <p:ph type="ftr" sz="quarter" idx="11"/>
+          </p:nvPr>
+        </p:nvSpPr>
+        <p:spPr/>
+        <p:txBody>
+          <a:bodyPr/>
+          <a:lstStyle/>
+          <a:p>
+            <a:r>
+              <a:rPr lang="fr-FR" smtClean="0"/>
+              <a:t>Présentation des CPGE - Classes de Terminales S</a:t>
+            </a:r>
+            <a:endParaRPr lang="fr-FR" dirty="0"/>
+          </a:p>
+        </p:txBody>
+      </p:sp>
+      <p:sp>
+        <p:nvSpPr>
+          <p:cNvPr id="4" name="Espace réservé du numéro de diapositive 3"/>
+          <p:cNvSpPr>
+            <a:spLocks noGrp="1"/>
+          </p:cNvSpPr>
+          <p:nvPr>
+            <p:ph type="sldNum" sz="quarter" idx="12"/>
+          </p:nvPr>
+        </p:nvSpPr>
+        <p:spPr/>
+        <p:txBody>
+          <a:bodyPr/>
+          <a:lstStyle/>
+          <a:p>
+            <a:fld id="{1CBB6DF8-B4DD-4E80-A138-72D154BCFFEE}" type="slidenum">
+              <a:rPr lang="fr-FR" smtClean="0"/>
+              <a:pPr/>
+              <a:t>16</a:t>
+            </a:fld>
+            <a:endParaRPr lang="fr-FR"/>
+          </a:p>
+        </p:txBody>
+      </p:sp>
+      <p:sp>
+        <p:nvSpPr>
+          <p:cNvPr id="5" name="Espace réservé du contenu 4"/>
+          <p:cNvSpPr>
+            <a:spLocks noGrp="1"/>
+          </p:cNvSpPr>
+          <p:nvPr>
+            <p:ph sz="quarter" idx="1"/>
+          </p:nvPr>
+        </p:nvSpPr>
+        <p:spPr>
+          <a:xfrm>
+            <a:off x="457200" y="1219200"/>
+            <a:ext cx="7643192" cy="4937760"/>
+          </a:xfrm>
+        </p:spPr>
+        <p:txBody>
+          <a:bodyPr>
+            <a:normAutofit fontScale="77500" lnSpcReduction="20000"/>
+          </a:bodyPr>
+          <a:lstStyle/>
+          <a:p>
+            <a:r>
+              <a:rPr lang="fr-FR" dirty="0" smtClean="0"/>
+              <a:t>2012 – 2014</a:t>
+            </a:r>
+          </a:p>
+          <a:p>
+            <a:pPr lvl="1"/>
+            <a:r>
+              <a:rPr lang="fr-FR" dirty="0" smtClean="0"/>
+              <a:t>Aucun 5/2</a:t>
+            </a:r>
+          </a:p>
+          <a:p>
+            <a:pPr lvl="1"/>
+            <a:r>
+              <a:rPr lang="fr-FR" dirty="0" smtClean="0"/>
+              <a:t>SUPAERO – ISAE : 1 (Admis Mines Ponts, Centrale Lyon…)</a:t>
+            </a:r>
+          </a:p>
+          <a:p>
+            <a:pPr lvl="1"/>
+            <a:r>
+              <a:rPr lang="fr-FR" dirty="0"/>
+              <a:t>Arts et Métiers </a:t>
+            </a:r>
+            <a:r>
+              <a:rPr lang="fr-FR" dirty="0" err="1"/>
+              <a:t>ParisTech</a:t>
+            </a:r>
+            <a:r>
+              <a:rPr lang="fr-FR" dirty="0"/>
+              <a:t> : 12 </a:t>
+            </a:r>
+            <a:r>
+              <a:rPr lang="fr-FR" dirty="0">
+                <a:solidFill>
+                  <a:srgbClr val="00B050"/>
+                </a:solidFill>
+              </a:rPr>
+              <a:t>(3)</a:t>
+            </a:r>
+            <a:endParaRPr lang="fr-FR" dirty="0"/>
+          </a:p>
+          <a:p>
+            <a:pPr lvl="1"/>
+            <a:r>
+              <a:rPr lang="fr-FR" dirty="0"/>
+              <a:t>ENSTA – </a:t>
+            </a:r>
+            <a:r>
+              <a:rPr lang="fr-FR" dirty="0" smtClean="0"/>
+              <a:t>1</a:t>
+            </a:r>
+          </a:p>
+          <a:p>
+            <a:pPr lvl="1"/>
+            <a:r>
+              <a:rPr lang="fr-FR" dirty="0" smtClean="0"/>
+              <a:t>Centrale </a:t>
+            </a:r>
+            <a:r>
+              <a:rPr lang="fr-FR" dirty="0"/>
+              <a:t>Marseille : 2</a:t>
+            </a:r>
+          </a:p>
+          <a:p>
+            <a:pPr lvl="1"/>
+            <a:r>
+              <a:rPr lang="fr-FR" dirty="0"/>
+              <a:t>INP Grenoble :  4</a:t>
+            </a:r>
+          </a:p>
+          <a:p>
+            <a:pPr lvl="1"/>
+            <a:r>
+              <a:rPr lang="fr-FR" dirty="0"/>
+              <a:t>ENSEIRB – </a:t>
+            </a:r>
+            <a:r>
+              <a:rPr lang="fr-FR" dirty="0" err="1"/>
+              <a:t>Matmeca</a:t>
+            </a:r>
+            <a:r>
+              <a:rPr lang="fr-FR" dirty="0"/>
+              <a:t> : </a:t>
+            </a:r>
+            <a:r>
+              <a:rPr lang="fr-FR" dirty="0" smtClean="0">
+                <a:solidFill>
+                  <a:srgbClr val="00B050"/>
+                </a:solidFill>
+              </a:rPr>
+              <a:t>1</a:t>
+            </a:r>
+          </a:p>
+          <a:p>
+            <a:pPr lvl="1"/>
+            <a:r>
+              <a:rPr lang="fr-FR" dirty="0" err="1" smtClean="0"/>
+              <a:t>Polytech</a:t>
+            </a:r>
+            <a:r>
+              <a:rPr lang="fr-FR" dirty="0" smtClean="0"/>
+              <a:t> (Lille, Marseille , Nantes, Nice, Orléans) : 6 </a:t>
+            </a:r>
+            <a:r>
+              <a:rPr lang="fr-FR" dirty="0" smtClean="0">
+                <a:solidFill>
+                  <a:srgbClr val="00B050"/>
+                </a:solidFill>
+              </a:rPr>
+              <a:t>(1)</a:t>
+            </a:r>
+          </a:p>
+          <a:p>
+            <a:pPr lvl="1"/>
+            <a:r>
+              <a:rPr lang="fr-FR" dirty="0" smtClean="0"/>
+              <a:t>ENSAIT – Roubaix : 1</a:t>
+            </a:r>
+          </a:p>
+          <a:p>
+            <a:pPr lvl="1"/>
+            <a:r>
+              <a:rPr lang="fr-FR" dirty="0" smtClean="0"/>
+              <a:t>EPF – Montpellier : 3</a:t>
+            </a:r>
+          </a:p>
+          <a:p>
+            <a:pPr lvl="1"/>
+            <a:r>
+              <a:rPr lang="fr-FR" dirty="0" smtClean="0"/>
+              <a:t>ISBS – Créteil : 1</a:t>
+            </a:r>
+          </a:p>
+          <a:p>
+            <a:pPr lvl="1"/>
+            <a:r>
+              <a:rPr lang="fr-FR" dirty="0" smtClean="0"/>
+              <a:t>ESI – Reims : </a:t>
+            </a:r>
+            <a:r>
+              <a:rPr lang="fr-FR" dirty="0" smtClean="0">
+                <a:solidFill>
+                  <a:srgbClr val="00B050"/>
+                </a:solidFill>
+              </a:rPr>
+              <a:t>1</a:t>
+            </a:r>
+          </a:p>
+          <a:p>
+            <a:pPr lvl="1"/>
+            <a:r>
+              <a:rPr lang="fr-FR" dirty="0" smtClean="0"/>
+              <a:t>ESILV : 1</a:t>
+            </a:r>
+          </a:p>
+          <a:p>
+            <a:pPr lvl="1"/>
+            <a:endParaRPr lang="fr-FR" dirty="0"/>
+          </a:p>
+          <a:p>
+            <a:pPr lvl="1"/>
+            <a:r>
+              <a:rPr lang="fr-FR" b="1" dirty="0" smtClean="0">
+                <a:solidFill>
+                  <a:srgbClr val="FF0000"/>
+                </a:solidFill>
+              </a:rPr>
+              <a:t>FORUM DES ECOLES CE VENDREDI 19/12</a:t>
+            </a:r>
+          </a:p>
+          <a:p>
+            <a:pPr lvl="1"/>
+            <a:endParaRPr lang="fr-FR" dirty="0" smtClean="0"/>
+          </a:p>
+          <a:p>
+            <a:pPr lvl="1"/>
+            <a:endParaRPr lang="fr-FR" dirty="0"/>
+          </a:p>
+        </p:txBody>
+      </p:sp>
+    </p:spTree>
+    <p:extLst>
+      <p:ext uri="{BB962C8B-B14F-4D97-AF65-F5344CB8AC3E}">
+        <p14:creationId xmlns:p14="http://schemas.microsoft.com/office/powerpoint/2010/main" val="3104956186"/>
+      </p:ext>
+    </p:extLst>
+  </p:cSld>
+  <p:clrMapOvr>
+    <a:masterClrMapping/>
+  </p:clrMapOvr>
 </p:sld>
 </file>
 

</xml_diff>